<commit_message>
For Lab #2, 1/31/20
</commit_message>
<xml_diff>
--- a/cs401_lab1_1_31_20.pptx
+++ b/cs401_lab1_1_31_20.pptx
@@ -268,7 +268,7 @@
           <a:p>
             <a:fld id="{331D76CF-5E7C-420B-89A3-7189BACB8345}" type="datetimeFigureOut">
               <a:rPr lang="en-US" smtClean="0"/>
-              <a:t>1/30/2020</a:t>
+              <a:t>1/31/2020</a:t>
             </a:fld>
             <a:endParaRPr lang="en-US"/>
           </a:p>
@@ -438,7 +438,7 @@
           <a:p>
             <a:fld id="{331D76CF-5E7C-420B-89A3-7189BACB8345}" type="datetimeFigureOut">
               <a:rPr lang="en-US" smtClean="0"/>
-              <a:t>1/30/2020</a:t>
+              <a:t>1/31/2020</a:t>
             </a:fld>
             <a:endParaRPr lang="en-US"/>
           </a:p>
@@ -618,7 +618,7 @@
           <a:p>
             <a:fld id="{331D76CF-5E7C-420B-89A3-7189BACB8345}" type="datetimeFigureOut">
               <a:rPr lang="en-US" smtClean="0"/>
-              <a:t>1/30/2020</a:t>
+              <a:t>1/31/2020</a:t>
             </a:fld>
             <a:endParaRPr lang="en-US"/>
           </a:p>
@@ -788,7 +788,7 @@
           <a:p>
             <a:fld id="{331D76CF-5E7C-420B-89A3-7189BACB8345}" type="datetimeFigureOut">
               <a:rPr lang="en-US" smtClean="0"/>
-              <a:t>1/30/2020</a:t>
+              <a:t>1/31/2020</a:t>
             </a:fld>
             <a:endParaRPr lang="en-US"/>
           </a:p>
@@ -1032,7 +1032,7 @@
           <a:p>
             <a:fld id="{331D76CF-5E7C-420B-89A3-7189BACB8345}" type="datetimeFigureOut">
               <a:rPr lang="en-US" smtClean="0"/>
-              <a:t>1/30/2020</a:t>
+              <a:t>1/31/2020</a:t>
             </a:fld>
             <a:endParaRPr lang="en-US"/>
           </a:p>
@@ -1264,7 +1264,7 @@
           <a:p>
             <a:fld id="{331D76CF-5E7C-420B-89A3-7189BACB8345}" type="datetimeFigureOut">
               <a:rPr lang="en-US" smtClean="0"/>
-              <a:t>1/30/2020</a:t>
+              <a:t>1/31/2020</a:t>
             </a:fld>
             <a:endParaRPr lang="en-US"/>
           </a:p>
@@ -1631,7 +1631,7 @@
           <a:p>
             <a:fld id="{331D76CF-5E7C-420B-89A3-7189BACB8345}" type="datetimeFigureOut">
               <a:rPr lang="en-US" smtClean="0"/>
-              <a:t>1/30/2020</a:t>
+              <a:t>1/31/2020</a:t>
             </a:fld>
             <a:endParaRPr lang="en-US"/>
           </a:p>
@@ -1749,7 +1749,7 @@
           <a:p>
             <a:fld id="{331D76CF-5E7C-420B-89A3-7189BACB8345}" type="datetimeFigureOut">
               <a:rPr lang="en-US" smtClean="0"/>
-              <a:t>1/30/2020</a:t>
+              <a:t>1/31/2020</a:t>
             </a:fld>
             <a:endParaRPr lang="en-US"/>
           </a:p>
@@ -1844,7 +1844,7 @@
           <a:p>
             <a:fld id="{331D76CF-5E7C-420B-89A3-7189BACB8345}" type="datetimeFigureOut">
               <a:rPr lang="en-US" smtClean="0"/>
-              <a:t>1/30/2020</a:t>
+              <a:t>1/31/2020</a:t>
             </a:fld>
             <a:endParaRPr lang="en-US"/>
           </a:p>
@@ -2121,7 +2121,7 @@
           <a:p>
             <a:fld id="{331D76CF-5E7C-420B-89A3-7189BACB8345}" type="datetimeFigureOut">
               <a:rPr lang="en-US" smtClean="0"/>
-              <a:t>1/30/2020</a:t>
+              <a:t>1/31/2020</a:t>
             </a:fld>
             <a:endParaRPr lang="en-US"/>
           </a:p>
@@ -2378,7 +2378,7 @@
           <a:p>
             <a:fld id="{331D76CF-5E7C-420B-89A3-7189BACB8345}" type="datetimeFigureOut">
               <a:rPr lang="en-US" smtClean="0"/>
-              <a:t>1/30/2020</a:t>
+              <a:t>1/31/2020</a:t>
             </a:fld>
             <a:endParaRPr lang="en-US"/>
           </a:p>
@@ -2591,7 +2591,7 @@
           <a:p>
             <a:fld id="{331D76CF-5E7C-420B-89A3-7189BACB8345}" type="datetimeFigureOut">
               <a:rPr lang="en-US" smtClean="0"/>
-              <a:t>1/30/2020</a:t>
+              <a:t>1/31/2020</a:t>
             </a:fld>
             <a:endParaRPr lang="en-US"/>
           </a:p>
@@ -3001,7 +3001,7 @@
           <p:cNvPr id="4" name="TextBox 3">
             <a:extLst>
               <a:ext uri="{FF2B5EF4-FFF2-40B4-BE49-F238E27FC236}">
-                <a16:creationId xmlns:a16="http://schemas.microsoft.com/office/drawing/2014/main" id="{8A67A37A-C488-40D7-A088-6774405888BB}"/>
+                <a16:creationId xmlns:a16="http://schemas.microsoft.com/office/drawing/2014/main" xmlns="" id="{8A67A37A-C488-40D7-A088-6774405888BB}"/>
               </a:ext>
             </a:extLst>
           </p:cNvPr>
@@ -3039,7 +3039,7 @@
           <p:cNvPr id="5" name="TextBox 4">
             <a:extLst>
               <a:ext uri="{FF2B5EF4-FFF2-40B4-BE49-F238E27FC236}">
-                <a16:creationId xmlns:a16="http://schemas.microsoft.com/office/drawing/2014/main" id="{EC931DCA-4690-4B93-9419-BA902293A61A}"/>
+                <a16:creationId xmlns:a16="http://schemas.microsoft.com/office/drawing/2014/main" xmlns="" id="{EC931DCA-4690-4B93-9419-BA902293A61A}"/>
               </a:ext>
             </a:extLst>
           </p:cNvPr>
@@ -3090,7 +3090,7 @@
           <p:cNvPr id="6" name="TextBox 5">
             <a:extLst>
               <a:ext uri="{FF2B5EF4-FFF2-40B4-BE49-F238E27FC236}">
-                <a16:creationId xmlns:a16="http://schemas.microsoft.com/office/drawing/2014/main" id="{69482C66-1608-4A0B-97A3-D6148119A6E2}"/>
+                <a16:creationId xmlns:a16="http://schemas.microsoft.com/office/drawing/2014/main" xmlns="" id="{69482C66-1608-4A0B-97A3-D6148119A6E2}"/>
               </a:ext>
             </a:extLst>
           </p:cNvPr>
@@ -3174,6 +3174,13 @@
   <p:clrMapOvr>
     <a:masterClrMapping/>
   </p:clrMapOvr>
+  <p:timing>
+    <p:tnLst>
+      <p:par>
+        <p:cTn id="1" dur="indefinite" restart="never" nodeType="tmRoot"/>
+      </p:par>
+    </p:tnLst>
+  </p:timing>
 </p:sld>
 </file>
 
@@ -3199,7 +3206,7 @@
           <p:cNvPr id="4" name="TextBox 3">
             <a:extLst>
               <a:ext uri="{FF2B5EF4-FFF2-40B4-BE49-F238E27FC236}">
-                <a16:creationId xmlns:a16="http://schemas.microsoft.com/office/drawing/2014/main" id="{8A67A37A-C488-40D7-A088-6774405888BB}"/>
+                <a16:creationId xmlns:a16="http://schemas.microsoft.com/office/drawing/2014/main" xmlns="" id="{8A67A37A-C488-40D7-A088-6774405888BB}"/>
               </a:ext>
             </a:extLst>
           </p:cNvPr>
@@ -3237,7 +3244,7 @@
           <p:cNvPr id="6" name="TextBox 5">
             <a:extLst>
               <a:ext uri="{FF2B5EF4-FFF2-40B4-BE49-F238E27FC236}">
-                <a16:creationId xmlns:a16="http://schemas.microsoft.com/office/drawing/2014/main" id="{FB464ED0-35D3-4E9B-9883-8E8D5BE963F2}"/>
+                <a16:creationId xmlns:a16="http://schemas.microsoft.com/office/drawing/2014/main" xmlns="" id="{FB464ED0-35D3-4E9B-9883-8E8D5BE963F2}"/>
               </a:ext>
             </a:extLst>
           </p:cNvPr>
@@ -3328,7 +3335,7 @@
           <p:cNvPr id="9" name="Picture 8" descr="CS 401 LAB#2 PALINDROMES - Mozilla Firefox">
             <a:extLst>
               <a:ext uri="{FF2B5EF4-FFF2-40B4-BE49-F238E27FC236}">
-                <a16:creationId xmlns:a16="http://schemas.microsoft.com/office/drawing/2014/main" id="{EDA72D5C-5964-4798-B075-34DBA28E6577}"/>
+                <a16:creationId xmlns:a16="http://schemas.microsoft.com/office/drawing/2014/main" xmlns="" id="{EDA72D5C-5964-4798-B075-34DBA28E6577}"/>
               </a:ext>
             </a:extLst>
           </p:cNvPr>
@@ -3368,6 +3375,13 @@
   <p:clrMapOvr>
     <a:masterClrMapping/>
   </p:clrMapOvr>
+  <p:timing>
+    <p:tnLst>
+      <p:par>
+        <p:cTn id="1" dur="indefinite" restart="never" nodeType="tmRoot"/>
+      </p:par>
+    </p:tnLst>
+  </p:timing>
 </p:sld>
 </file>
 
@@ -3393,7 +3407,7 @@
           <p:cNvPr id="4" name="TextBox 3">
             <a:extLst>
               <a:ext uri="{FF2B5EF4-FFF2-40B4-BE49-F238E27FC236}">
-                <a16:creationId xmlns:a16="http://schemas.microsoft.com/office/drawing/2014/main" id="{8A67A37A-C488-40D7-A088-6774405888BB}"/>
+                <a16:creationId xmlns:a16="http://schemas.microsoft.com/office/drawing/2014/main" xmlns="" id="{8A67A37A-C488-40D7-A088-6774405888BB}"/>
               </a:ext>
             </a:extLst>
           </p:cNvPr>
@@ -3431,7 +3445,7 @@
           <p:cNvPr id="3" name="Picture 2" descr="C:\Users\Karin\Google Drive\CS\CS401MD\Lab2.java - Notepad++">
             <a:extLst>
               <a:ext uri="{FF2B5EF4-FFF2-40B4-BE49-F238E27FC236}">
-                <a16:creationId xmlns:a16="http://schemas.microsoft.com/office/drawing/2014/main" id="{D8DA2371-1908-4B52-87F9-FFE00E26DFD4}"/>
+                <a16:creationId xmlns:a16="http://schemas.microsoft.com/office/drawing/2014/main" xmlns="" id="{D8DA2371-1908-4B52-87F9-FFE00E26DFD4}"/>
               </a:ext>
             </a:extLst>
           </p:cNvPr>
@@ -3466,7 +3480,7 @@
           <p:cNvPr id="7" name="TextBox 6">
             <a:extLst>
               <a:ext uri="{FF2B5EF4-FFF2-40B4-BE49-F238E27FC236}">
-                <a16:creationId xmlns:a16="http://schemas.microsoft.com/office/drawing/2014/main" id="{97A58CCC-1E1B-4F2B-AAC4-053FC1EC0880}"/>
+                <a16:creationId xmlns:a16="http://schemas.microsoft.com/office/drawing/2014/main" xmlns="" id="{97A58CCC-1E1B-4F2B-AAC4-053FC1EC0880}"/>
               </a:ext>
             </a:extLst>
           </p:cNvPr>
@@ -3631,6 +3645,13 @@
   <p:clrMapOvr>
     <a:masterClrMapping/>
   </p:clrMapOvr>
+  <p:timing>
+    <p:tnLst>
+      <p:par>
+        <p:cTn id="1" dur="indefinite" restart="never" nodeType="tmRoot"/>
+      </p:par>
+    </p:tnLst>
+  </p:timing>
 </p:sld>
 </file>
 
@@ -3656,7 +3677,7 @@
           <p:cNvPr id="4" name="TextBox 3">
             <a:extLst>
               <a:ext uri="{FF2B5EF4-FFF2-40B4-BE49-F238E27FC236}">
-                <a16:creationId xmlns:a16="http://schemas.microsoft.com/office/drawing/2014/main" id="{8A67A37A-C488-40D7-A088-6774405888BB}"/>
+                <a16:creationId xmlns:a16="http://schemas.microsoft.com/office/drawing/2014/main" xmlns="" id="{8A67A37A-C488-40D7-A088-6774405888BB}"/>
               </a:ext>
             </a:extLst>
           </p:cNvPr>
@@ -3694,7 +3715,7 @@
           <p:cNvPr id="6" name="Picture 5" descr="CS 401 LAB#2 PALINDROMES - Mozilla Firefox">
             <a:extLst>
               <a:ext uri="{FF2B5EF4-FFF2-40B4-BE49-F238E27FC236}">
-                <a16:creationId xmlns:a16="http://schemas.microsoft.com/office/drawing/2014/main" id="{791F8CD6-59C5-4615-A898-1A500E85E534}"/>
+                <a16:creationId xmlns:a16="http://schemas.microsoft.com/office/drawing/2014/main" xmlns="" id="{791F8CD6-59C5-4615-A898-1A500E85E534}"/>
               </a:ext>
             </a:extLst>
           </p:cNvPr>
@@ -3734,7 +3755,7 @@
           <p:cNvPr id="11" name="Straight Connector 10">
             <a:extLst>
               <a:ext uri="{FF2B5EF4-FFF2-40B4-BE49-F238E27FC236}">
-                <a16:creationId xmlns:a16="http://schemas.microsoft.com/office/drawing/2014/main" id="{BF2BBEC9-E58E-411F-BAC5-1660DF1E4151}"/>
+                <a16:creationId xmlns:a16="http://schemas.microsoft.com/office/drawing/2014/main" xmlns="" id="{BF2BBEC9-E58E-411F-BAC5-1660DF1E4151}"/>
               </a:ext>
             </a:extLst>
           </p:cNvPr>
@@ -3771,7 +3792,7 @@
           <p:cNvPr id="12" name="Straight Connector 11">
             <a:extLst>
               <a:ext uri="{FF2B5EF4-FFF2-40B4-BE49-F238E27FC236}">
-                <a16:creationId xmlns:a16="http://schemas.microsoft.com/office/drawing/2014/main" id="{7A8FA6ED-D630-47D7-A6CE-BF9EE52BE928}"/>
+                <a16:creationId xmlns:a16="http://schemas.microsoft.com/office/drawing/2014/main" xmlns="" id="{7A8FA6ED-D630-47D7-A6CE-BF9EE52BE928}"/>
               </a:ext>
             </a:extLst>
           </p:cNvPr>
@@ -3810,7 +3831,7 @@
           <p:cNvPr id="14" name="Straight Connector 13">
             <a:extLst>
               <a:ext uri="{FF2B5EF4-FFF2-40B4-BE49-F238E27FC236}">
-                <a16:creationId xmlns:a16="http://schemas.microsoft.com/office/drawing/2014/main" id="{5BCD062C-F20B-499F-BF5F-C871302BA3FA}"/>
+                <a16:creationId xmlns:a16="http://schemas.microsoft.com/office/drawing/2014/main" xmlns="" id="{5BCD062C-F20B-499F-BF5F-C871302BA3FA}"/>
               </a:ext>
             </a:extLst>
           </p:cNvPr>
@@ -3849,7 +3870,7 @@
           <p:cNvPr id="15" name="Straight Connector 14">
             <a:extLst>
               <a:ext uri="{FF2B5EF4-FFF2-40B4-BE49-F238E27FC236}">
-                <a16:creationId xmlns:a16="http://schemas.microsoft.com/office/drawing/2014/main" id="{DA91D25D-154C-42A9-933E-81040E7BBE2C}"/>
+                <a16:creationId xmlns:a16="http://schemas.microsoft.com/office/drawing/2014/main" xmlns="" id="{DA91D25D-154C-42A9-933E-81040E7BBE2C}"/>
               </a:ext>
             </a:extLst>
           </p:cNvPr>
@@ -3888,7 +3909,7 @@
           <p:cNvPr id="16" name="TextBox 15">
             <a:extLst>
               <a:ext uri="{FF2B5EF4-FFF2-40B4-BE49-F238E27FC236}">
-                <a16:creationId xmlns:a16="http://schemas.microsoft.com/office/drawing/2014/main" id="{1CAA9454-9B68-4466-8436-AB97C67830BE}"/>
+                <a16:creationId xmlns:a16="http://schemas.microsoft.com/office/drawing/2014/main" xmlns="" id="{1CAA9454-9B68-4466-8436-AB97C67830BE}"/>
               </a:ext>
             </a:extLst>
           </p:cNvPr>
@@ -3933,6 +3954,13 @@
   <p:clrMapOvr>
     <a:masterClrMapping/>
   </p:clrMapOvr>
+  <p:timing>
+    <p:tnLst>
+      <p:par>
+        <p:cTn id="1" dur="indefinite" restart="never" nodeType="tmRoot"/>
+      </p:par>
+    </p:tnLst>
+  </p:timing>
 </p:sld>
 </file>
 
@@ -3958,7 +3986,7 @@
           <p:cNvPr id="4" name="TextBox 3">
             <a:extLst>
               <a:ext uri="{FF2B5EF4-FFF2-40B4-BE49-F238E27FC236}">
-                <a16:creationId xmlns:a16="http://schemas.microsoft.com/office/drawing/2014/main" id="{8A67A37A-C488-40D7-A088-6774405888BB}"/>
+                <a16:creationId xmlns:a16="http://schemas.microsoft.com/office/drawing/2014/main" xmlns="" id="{8A67A37A-C488-40D7-A088-6774405888BB}"/>
               </a:ext>
             </a:extLst>
           </p:cNvPr>
@@ -4012,7 +4040,7 @@
           <p:cNvPr id="7" name="Picture 6" descr="C:\Users\Karin\Google Drive\CS\CS401MD\Lab2.java - Notepad++">
             <a:extLst>
               <a:ext uri="{FF2B5EF4-FFF2-40B4-BE49-F238E27FC236}">
-                <a16:creationId xmlns:a16="http://schemas.microsoft.com/office/drawing/2014/main" id="{6695006C-5C35-4899-906E-D8CA74B869BD}"/>
+                <a16:creationId xmlns:a16="http://schemas.microsoft.com/office/drawing/2014/main" xmlns="" id="{6695006C-5C35-4899-906E-D8CA74B869BD}"/>
               </a:ext>
             </a:extLst>
           </p:cNvPr>
@@ -4047,7 +4075,7 @@
           <p:cNvPr id="8" name="TextBox 7">
             <a:extLst>
               <a:ext uri="{FF2B5EF4-FFF2-40B4-BE49-F238E27FC236}">
-                <a16:creationId xmlns:a16="http://schemas.microsoft.com/office/drawing/2014/main" id="{AF1C2D11-9872-45A8-AAC6-2B73704A922E}"/>
+                <a16:creationId xmlns:a16="http://schemas.microsoft.com/office/drawing/2014/main" xmlns="" id="{AF1C2D11-9872-45A8-AAC6-2B73704A922E}"/>
               </a:ext>
             </a:extLst>
           </p:cNvPr>
@@ -4133,6 +4161,13 @@
   <p:clrMapOvr>
     <a:masterClrMapping/>
   </p:clrMapOvr>
+  <p:timing>
+    <p:tnLst>
+      <p:par>
+        <p:cTn id="1" dur="indefinite" restart="never" nodeType="tmRoot"/>
+      </p:par>
+    </p:tnLst>
+  </p:timing>
 </p:sld>
 </file>
 
@@ -4158,7 +4193,7 @@
           <p:cNvPr id="4" name="TextBox 3">
             <a:extLst>
               <a:ext uri="{FF2B5EF4-FFF2-40B4-BE49-F238E27FC236}">
-                <a16:creationId xmlns:a16="http://schemas.microsoft.com/office/drawing/2014/main" id="{8A67A37A-C488-40D7-A088-6774405888BB}"/>
+                <a16:creationId xmlns:a16="http://schemas.microsoft.com/office/drawing/2014/main" xmlns="" id="{8A67A37A-C488-40D7-A088-6774405888BB}"/>
               </a:ext>
             </a:extLst>
           </p:cNvPr>
@@ -4212,7 +4247,7 @@
           <p:cNvPr id="8" name="TextBox 7">
             <a:extLst>
               <a:ext uri="{FF2B5EF4-FFF2-40B4-BE49-F238E27FC236}">
-                <a16:creationId xmlns:a16="http://schemas.microsoft.com/office/drawing/2014/main" id="{AF1C2D11-9872-45A8-AAC6-2B73704A922E}"/>
+                <a16:creationId xmlns:a16="http://schemas.microsoft.com/office/drawing/2014/main" xmlns="" id="{AF1C2D11-9872-45A8-AAC6-2B73704A922E}"/>
               </a:ext>
             </a:extLst>
           </p:cNvPr>
@@ -4305,7 +4340,7 @@
           <p:cNvPr id="3" name="Picture 2" descr="C:\Users\Karin\Google Drive\CS\CS401MD\Lab2.java - Notepad++">
             <a:extLst>
               <a:ext uri="{FF2B5EF4-FFF2-40B4-BE49-F238E27FC236}">
-                <a16:creationId xmlns:a16="http://schemas.microsoft.com/office/drawing/2014/main" id="{D94B6D53-284C-4A7C-A529-66942A348D89}"/>
+                <a16:creationId xmlns:a16="http://schemas.microsoft.com/office/drawing/2014/main" xmlns="" id="{D94B6D53-284C-4A7C-A529-66942A348D89}"/>
               </a:ext>
             </a:extLst>
           </p:cNvPr>
@@ -4345,6 +4380,13 @@
   <p:clrMapOvr>
     <a:masterClrMapping/>
   </p:clrMapOvr>
+  <p:timing>
+    <p:tnLst>
+      <p:par>
+        <p:cTn id="1" dur="indefinite" restart="never" nodeType="tmRoot"/>
+      </p:par>
+    </p:tnLst>
+  </p:timing>
 </p:sld>
 </file>
 
@@ -4370,7 +4412,7 @@
           <p:cNvPr id="4" name="TextBox 3">
             <a:extLst>
               <a:ext uri="{FF2B5EF4-FFF2-40B4-BE49-F238E27FC236}">
-                <a16:creationId xmlns:a16="http://schemas.microsoft.com/office/drawing/2014/main" id="{8A67A37A-C488-40D7-A088-6774405888BB}"/>
+                <a16:creationId xmlns:a16="http://schemas.microsoft.com/office/drawing/2014/main" xmlns="" id="{8A67A37A-C488-40D7-A088-6774405888BB}"/>
               </a:ext>
             </a:extLst>
           </p:cNvPr>
@@ -4408,7 +4450,7 @@
           <p:cNvPr id="8" name="TextBox 7">
             <a:extLst>
               <a:ext uri="{FF2B5EF4-FFF2-40B4-BE49-F238E27FC236}">
-                <a16:creationId xmlns:a16="http://schemas.microsoft.com/office/drawing/2014/main" id="{AF1C2D11-9872-45A8-AAC6-2B73704A922E}"/>
+                <a16:creationId xmlns:a16="http://schemas.microsoft.com/office/drawing/2014/main" xmlns="" id="{AF1C2D11-9872-45A8-AAC6-2B73704A922E}"/>
               </a:ext>
             </a:extLst>
           </p:cNvPr>
@@ -4471,6 +4513,13 @@
   <p:clrMapOvr>
     <a:masterClrMapping/>
   </p:clrMapOvr>
+  <p:timing>
+    <p:tnLst>
+      <p:par>
+        <p:cTn id="1" dur="indefinite" restart="never" nodeType="tmRoot"/>
+      </p:par>
+    </p:tnLst>
+  </p:timing>
 </p:sld>
 </file>
 
@@ -4496,7 +4545,7 @@
           <p:cNvPr id="4" name="TextBox 3">
             <a:extLst>
               <a:ext uri="{FF2B5EF4-FFF2-40B4-BE49-F238E27FC236}">
-                <a16:creationId xmlns:a16="http://schemas.microsoft.com/office/drawing/2014/main" id="{8A67A37A-C488-40D7-A088-6774405888BB}"/>
+                <a16:creationId xmlns:a16="http://schemas.microsoft.com/office/drawing/2014/main" xmlns="" id="{8A67A37A-C488-40D7-A088-6774405888BB}"/>
               </a:ext>
             </a:extLst>
           </p:cNvPr>
@@ -4534,7 +4583,7 @@
           <p:cNvPr id="5" name="TextBox 4">
             <a:extLst>
               <a:ext uri="{FF2B5EF4-FFF2-40B4-BE49-F238E27FC236}">
-                <a16:creationId xmlns:a16="http://schemas.microsoft.com/office/drawing/2014/main" id="{EC931DCA-4690-4B93-9419-BA902293A61A}"/>
+                <a16:creationId xmlns:a16="http://schemas.microsoft.com/office/drawing/2014/main" xmlns="" id="{EC931DCA-4690-4B93-9419-BA902293A61A}"/>
               </a:ext>
             </a:extLst>
           </p:cNvPr>
@@ -4585,7 +4634,7 @@
           <p:cNvPr id="6" name="TextBox 5">
             <a:extLst>
               <a:ext uri="{FF2B5EF4-FFF2-40B4-BE49-F238E27FC236}">
-                <a16:creationId xmlns:a16="http://schemas.microsoft.com/office/drawing/2014/main" id="{69482C66-1608-4A0B-97A3-D6148119A6E2}"/>
+                <a16:creationId xmlns:a16="http://schemas.microsoft.com/office/drawing/2014/main" xmlns="" id="{69482C66-1608-4A0B-97A3-D6148119A6E2}"/>
               </a:ext>
             </a:extLst>
           </p:cNvPr>
@@ -4669,6 +4718,13 @@
   <p:clrMapOvr>
     <a:masterClrMapping/>
   </p:clrMapOvr>
+  <p:timing>
+    <p:tnLst>
+      <p:par>
+        <p:cTn id="1" dur="indefinite" restart="never" nodeType="tmRoot"/>
+      </p:par>
+    </p:tnLst>
+  </p:timing>
 </p:sld>
 </file>
 
@@ -4694,7 +4750,7 @@
           <p:cNvPr id="4" name="TextBox 3">
             <a:extLst>
               <a:ext uri="{FF2B5EF4-FFF2-40B4-BE49-F238E27FC236}">
-                <a16:creationId xmlns:a16="http://schemas.microsoft.com/office/drawing/2014/main" id="{8A67A37A-C488-40D7-A088-6774405888BB}"/>
+                <a16:creationId xmlns:a16="http://schemas.microsoft.com/office/drawing/2014/main" xmlns="" id="{8A67A37A-C488-40D7-A088-6774405888BB}"/>
               </a:ext>
             </a:extLst>
           </p:cNvPr>
@@ -4732,7 +4788,7 @@
           <p:cNvPr id="5" name="TextBox 4">
             <a:extLst>
               <a:ext uri="{FF2B5EF4-FFF2-40B4-BE49-F238E27FC236}">
-                <a16:creationId xmlns:a16="http://schemas.microsoft.com/office/drawing/2014/main" id="{EC931DCA-4690-4B93-9419-BA902293A61A}"/>
+                <a16:creationId xmlns:a16="http://schemas.microsoft.com/office/drawing/2014/main" xmlns="" id="{EC931DCA-4690-4B93-9419-BA902293A61A}"/>
               </a:ext>
             </a:extLst>
           </p:cNvPr>
@@ -4822,6 +4878,13 @@
   <p:clrMapOvr>
     <a:masterClrMapping/>
   </p:clrMapOvr>
+  <p:timing>
+    <p:tnLst>
+      <p:par>
+        <p:cTn id="1" dur="indefinite" restart="never" nodeType="tmRoot"/>
+      </p:par>
+    </p:tnLst>
+  </p:timing>
 </p:sld>
 </file>
 
@@ -4847,7 +4910,7 @@
           <p:cNvPr id="4" name="TextBox 3">
             <a:extLst>
               <a:ext uri="{FF2B5EF4-FFF2-40B4-BE49-F238E27FC236}">
-                <a16:creationId xmlns:a16="http://schemas.microsoft.com/office/drawing/2014/main" id="{8A67A37A-C488-40D7-A088-6774405888BB}"/>
+                <a16:creationId xmlns:a16="http://schemas.microsoft.com/office/drawing/2014/main" xmlns="" id="{8A67A37A-C488-40D7-A088-6774405888BB}"/>
               </a:ext>
             </a:extLst>
           </p:cNvPr>
@@ -4885,7 +4948,7 @@
           <p:cNvPr id="5" name="TextBox 4">
             <a:extLst>
               <a:ext uri="{FF2B5EF4-FFF2-40B4-BE49-F238E27FC236}">
-                <a16:creationId xmlns:a16="http://schemas.microsoft.com/office/drawing/2014/main" id="{EC931DCA-4690-4B93-9419-BA902293A61A}"/>
+                <a16:creationId xmlns:a16="http://schemas.microsoft.com/office/drawing/2014/main" xmlns="" id="{EC931DCA-4690-4B93-9419-BA902293A61A}"/>
               </a:ext>
             </a:extLst>
           </p:cNvPr>
@@ -5159,6 +5222,13 @@
   <p:clrMapOvr>
     <a:masterClrMapping/>
   </p:clrMapOvr>
+  <p:timing>
+    <p:tnLst>
+      <p:par>
+        <p:cTn id="1" dur="indefinite" restart="never" nodeType="tmRoot"/>
+      </p:par>
+    </p:tnLst>
+  </p:timing>
 </p:sld>
 </file>
 
@@ -5184,7 +5254,7 @@
           <p:cNvPr id="4" name="TextBox 3">
             <a:extLst>
               <a:ext uri="{FF2B5EF4-FFF2-40B4-BE49-F238E27FC236}">
-                <a16:creationId xmlns:a16="http://schemas.microsoft.com/office/drawing/2014/main" id="{8A67A37A-C488-40D7-A088-6774405888BB}"/>
+                <a16:creationId xmlns:a16="http://schemas.microsoft.com/office/drawing/2014/main" xmlns="" id="{8A67A37A-C488-40D7-A088-6774405888BB}"/>
               </a:ext>
             </a:extLst>
           </p:cNvPr>
@@ -5222,7 +5292,7 @@
           <p:cNvPr id="5" name="TextBox 4">
             <a:extLst>
               <a:ext uri="{FF2B5EF4-FFF2-40B4-BE49-F238E27FC236}">
-                <a16:creationId xmlns:a16="http://schemas.microsoft.com/office/drawing/2014/main" id="{EC931DCA-4690-4B93-9419-BA902293A61A}"/>
+                <a16:creationId xmlns:a16="http://schemas.microsoft.com/office/drawing/2014/main" xmlns="" id="{EC931DCA-4690-4B93-9419-BA902293A61A}"/>
               </a:ext>
             </a:extLst>
           </p:cNvPr>
@@ -5399,6 +5469,13 @@
   <p:clrMapOvr>
     <a:masterClrMapping/>
   </p:clrMapOvr>
+  <p:timing>
+    <p:tnLst>
+      <p:par>
+        <p:cTn id="1" dur="indefinite" restart="never" nodeType="tmRoot"/>
+      </p:par>
+    </p:tnLst>
+  </p:timing>
 </p:sld>
 </file>
 
@@ -5424,7 +5501,7 @@
           <p:cNvPr id="4" name="TextBox 3">
             <a:extLst>
               <a:ext uri="{FF2B5EF4-FFF2-40B4-BE49-F238E27FC236}">
-                <a16:creationId xmlns:a16="http://schemas.microsoft.com/office/drawing/2014/main" id="{8A67A37A-C488-40D7-A088-6774405888BB}"/>
+                <a16:creationId xmlns:a16="http://schemas.microsoft.com/office/drawing/2014/main" xmlns="" id="{8A67A37A-C488-40D7-A088-6774405888BB}"/>
               </a:ext>
             </a:extLst>
           </p:cNvPr>
@@ -5462,7 +5539,7 @@
           <p:cNvPr id="5" name="TextBox 4">
             <a:extLst>
               <a:ext uri="{FF2B5EF4-FFF2-40B4-BE49-F238E27FC236}">
-                <a16:creationId xmlns:a16="http://schemas.microsoft.com/office/drawing/2014/main" id="{EC931DCA-4690-4B93-9419-BA902293A61A}"/>
+                <a16:creationId xmlns:a16="http://schemas.microsoft.com/office/drawing/2014/main" xmlns="" id="{EC931DCA-4690-4B93-9419-BA902293A61A}"/>
               </a:ext>
             </a:extLst>
           </p:cNvPr>
@@ -5545,7 +5622,7 @@
           <p:cNvPr id="2" name="Rectangle 1">
             <a:extLst>
               <a:ext uri="{FF2B5EF4-FFF2-40B4-BE49-F238E27FC236}">
-                <a16:creationId xmlns:a16="http://schemas.microsoft.com/office/drawing/2014/main" id="{AD332A47-9E1D-4143-BCE1-C993357866F3}"/>
+                <a16:creationId xmlns:a16="http://schemas.microsoft.com/office/drawing/2014/main" xmlns="" id="{AD332A47-9E1D-4143-BCE1-C993357866F3}"/>
               </a:ext>
             </a:extLst>
           </p:cNvPr>
@@ -5596,11 +5673,29 @@
                 </a:solidFill>
                 <a:sym typeface="Wingdings" panose="05000000000000000000" pitchFamily="2" charset="2"/>
               </a:rPr>
-              <a:t>ls</a:t>
-            </a:r>
-          </a:p>
-          <a:p>
-            <a:pPr lvl="1"/>
+              <a:t>l</a:t>
+            </a:r>
+            <a:r>
+              <a:rPr lang="en-US" sz="2200" dirty="0" smtClean="0">
+                <a:solidFill>
+                  <a:srgbClr val="002060"/>
+                </a:solidFill>
+                <a:sym typeface="Wingdings" panose="05000000000000000000" pitchFamily="2" charset="2"/>
+              </a:rPr>
+              <a:t>s</a:t>
+            </a:r>
+          </a:p>
+          <a:p>
+            <a:pPr lvl="1"/>
+            <a:r>
+              <a:rPr lang="en-US" sz="2200" dirty="0" err="1" smtClean="0">
+                <a:solidFill>
+                  <a:srgbClr val="002060"/>
+                </a:solidFill>
+                <a:sym typeface="Wingdings" panose="05000000000000000000" pitchFamily="2" charset="2"/>
+              </a:rPr>
+              <a:t>pwd</a:t>
+            </a:r>
             <a:endParaRPr lang="en-US" sz="2200" dirty="0">
               <a:solidFill>
                 <a:srgbClr val="002060"/>
@@ -5785,6 +5880,13 @@
   <p:clrMapOvr>
     <a:masterClrMapping/>
   </p:clrMapOvr>
+  <p:timing>
+    <p:tnLst>
+      <p:par>
+        <p:cTn id="1" dur="indefinite" restart="never" nodeType="tmRoot"/>
+      </p:par>
+    </p:tnLst>
+  </p:timing>
 </p:sld>
 </file>
 
@@ -5810,7 +5912,7 @@
           <p:cNvPr id="4" name="TextBox 3">
             <a:extLst>
               <a:ext uri="{FF2B5EF4-FFF2-40B4-BE49-F238E27FC236}">
-                <a16:creationId xmlns:a16="http://schemas.microsoft.com/office/drawing/2014/main" id="{8A67A37A-C488-40D7-A088-6774405888BB}"/>
+                <a16:creationId xmlns:a16="http://schemas.microsoft.com/office/drawing/2014/main" xmlns="" id="{8A67A37A-C488-40D7-A088-6774405888BB}"/>
               </a:ext>
             </a:extLst>
           </p:cNvPr>
@@ -5848,7 +5950,7 @@
           <p:cNvPr id="5" name="TextBox 4">
             <a:extLst>
               <a:ext uri="{FF2B5EF4-FFF2-40B4-BE49-F238E27FC236}">
-                <a16:creationId xmlns:a16="http://schemas.microsoft.com/office/drawing/2014/main" id="{EC931DCA-4690-4B93-9419-BA902293A61A}"/>
+                <a16:creationId xmlns:a16="http://schemas.microsoft.com/office/drawing/2014/main" xmlns="" id="{EC931DCA-4690-4B93-9419-BA902293A61A}"/>
               </a:ext>
             </a:extLst>
           </p:cNvPr>
@@ -6001,6 +6103,13 @@
   <p:clrMapOvr>
     <a:masterClrMapping/>
   </p:clrMapOvr>
+  <p:timing>
+    <p:tnLst>
+      <p:par>
+        <p:cTn id="1" dur="indefinite" restart="never" nodeType="tmRoot"/>
+      </p:par>
+    </p:tnLst>
+  </p:timing>
 </p:sld>
 </file>
 
@@ -6026,7 +6135,7 @@
           <p:cNvPr id="4" name="TextBox 3">
             <a:extLst>
               <a:ext uri="{FF2B5EF4-FFF2-40B4-BE49-F238E27FC236}">
-                <a16:creationId xmlns:a16="http://schemas.microsoft.com/office/drawing/2014/main" id="{8A67A37A-C488-40D7-A088-6774405888BB}"/>
+                <a16:creationId xmlns:a16="http://schemas.microsoft.com/office/drawing/2014/main" xmlns="" id="{8A67A37A-C488-40D7-A088-6774405888BB}"/>
               </a:ext>
             </a:extLst>
           </p:cNvPr>
@@ -6064,7 +6173,7 @@
           <p:cNvPr id="6" name="TextBox 5">
             <a:extLst>
               <a:ext uri="{FF2B5EF4-FFF2-40B4-BE49-F238E27FC236}">
-                <a16:creationId xmlns:a16="http://schemas.microsoft.com/office/drawing/2014/main" id="{FB464ED0-35D3-4E9B-9883-8E8D5BE963F2}"/>
+                <a16:creationId xmlns:a16="http://schemas.microsoft.com/office/drawing/2014/main" xmlns="" id="{FB464ED0-35D3-4E9B-9883-8E8D5BE963F2}"/>
               </a:ext>
             </a:extLst>
           </p:cNvPr>
@@ -6143,7 +6252,7 @@
           <p:cNvPr id="5" name="Picture 4" descr="C:\Users\Karin\Google Drive\CS\CS401MD\L2input.txt - Notepad++">
             <a:extLst>
               <a:ext uri="{FF2B5EF4-FFF2-40B4-BE49-F238E27FC236}">
-                <a16:creationId xmlns:a16="http://schemas.microsoft.com/office/drawing/2014/main" id="{E52DB760-2265-4EC1-AD66-26AE8313B1AB}"/>
+                <a16:creationId xmlns:a16="http://schemas.microsoft.com/office/drawing/2014/main" xmlns="" id="{E52DB760-2265-4EC1-AD66-26AE8313B1AB}"/>
               </a:ext>
             </a:extLst>
           </p:cNvPr>
@@ -6178,7 +6287,7 @@
           <p:cNvPr id="9" name="Picture 8" descr="CS 401 LAB#2 PALINDROMES - Mozilla Firefox">
             <a:extLst>
               <a:ext uri="{FF2B5EF4-FFF2-40B4-BE49-F238E27FC236}">
-                <a16:creationId xmlns:a16="http://schemas.microsoft.com/office/drawing/2014/main" id="{EDA72D5C-5964-4798-B075-34DBA28E6577}"/>
+                <a16:creationId xmlns:a16="http://schemas.microsoft.com/office/drawing/2014/main" xmlns="" id="{EDA72D5C-5964-4798-B075-34DBA28E6577}"/>
               </a:ext>
             </a:extLst>
           </p:cNvPr>
@@ -6213,7 +6322,7 @@
           <p:cNvPr id="11" name="TextBox 10">
             <a:extLst>
               <a:ext uri="{FF2B5EF4-FFF2-40B4-BE49-F238E27FC236}">
-                <a16:creationId xmlns:a16="http://schemas.microsoft.com/office/drawing/2014/main" id="{443F371C-834D-4E89-A025-CC449C4BCE78}"/>
+                <a16:creationId xmlns:a16="http://schemas.microsoft.com/office/drawing/2014/main" xmlns="" id="{443F371C-834D-4E89-A025-CC449C4BCE78}"/>
               </a:ext>
             </a:extLst>
           </p:cNvPr>
@@ -6253,6 +6362,13 @@
   <p:clrMapOvr>
     <a:masterClrMapping/>
   </p:clrMapOvr>
+  <p:timing>
+    <p:tnLst>
+      <p:par>
+        <p:cTn id="1" dur="indefinite" restart="never" nodeType="tmRoot"/>
+      </p:par>
+    </p:tnLst>
+  </p:timing>
 </p:sld>
 </file>
 
@@ -6278,7 +6394,7 @@
           <p:cNvPr id="4" name="TextBox 3">
             <a:extLst>
               <a:ext uri="{FF2B5EF4-FFF2-40B4-BE49-F238E27FC236}">
-                <a16:creationId xmlns:a16="http://schemas.microsoft.com/office/drawing/2014/main" id="{8A67A37A-C488-40D7-A088-6774405888BB}"/>
+                <a16:creationId xmlns:a16="http://schemas.microsoft.com/office/drawing/2014/main" xmlns="" id="{8A67A37A-C488-40D7-A088-6774405888BB}"/>
               </a:ext>
             </a:extLst>
           </p:cNvPr>
@@ -6316,7 +6432,7 @@
           <p:cNvPr id="6" name="TextBox 5">
             <a:extLst>
               <a:ext uri="{FF2B5EF4-FFF2-40B4-BE49-F238E27FC236}">
-                <a16:creationId xmlns:a16="http://schemas.microsoft.com/office/drawing/2014/main" id="{FB464ED0-35D3-4E9B-9883-8E8D5BE963F2}"/>
+                <a16:creationId xmlns:a16="http://schemas.microsoft.com/office/drawing/2014/main" xmlns="" id="{FB464ED0-35D3-4E9B-9883-8E8D5BE963F2}"/>
               </a:ext>
             </a:extLst>
           </p:cNvPr>
@@ -6372,7 +6488,7 @@
           <p:cNvPr id="9" name="Picture 8" descr="CS 401 LAB#2 PALINDROMES - Mozilla Firefox">
             <a:extLst>
               <a:ext uri="{FF2B5EF4-FFF2-40B4-BE49-F238E27FC236}">
-                <a16:creationId xmlns:a16="http://schemas.microsoft.com/office/drawing/2014/main" id="{EDA72D5C-5964-4798-B075-34DBA28E6577}"/>
+                <a16:creationId xmlns:a16="http://schemas.microsoft.com/office/drawing/2014/main" xmlns="" id="{EDA72D5C-5964-4798-B075-34DBA28E6577}"/>
               </a:ext>
             </a:extLst>
           </p:cNvPr>
@@ -6407,7 +6523,7 @@
           <p:cNvPr id="3" name="Picture 2" descr="PALINDROME | definition in the Cambridge English Dictionary - Mozilla Firefox">
             <a:extLst>
               <a:ext uri="{FF2B5EF4-FFF2-40B4-BE49-F238E27FC236}">
-                <a16:creationId xmlns:a16="http://schemas.microsoft.com/office/drawing/2014/main" id="{9085B59C-D6EC-4CDC-85BE-867250249B21}"/>
+                <a16:creationId xmlns:a16="http://schemas.microsoft.com/office/drawing/2014/main" xmlns="" id="{9085B59C-D6EC-4CDC-85BE-867250249B21}"/>
               </a:ext>
             </a:extLst>
           </p:cNvPr>
@@ -6454,6 +6570,13 @@
   <p:clrMapOvr>
     <a:masterClrMapping/>
   </p:clrMapOvr>
+  <p:timing>
+    <p:tnLst>
+      <p:par>
+        <p:cTn id="1" dur="indefinite" restart="never" nodeType="tmRoot"/>
+      </p:par>
+    </p:tnLst>
+  </p:timing>
 </p:sld>
 </file>
 

</xml_diff>